<commit_message>
Signed-off-by: Jithendra Sirimanne <jithendradssc@gmail.com>
</commit_message>
<xml_diff>
--- a/presentations/Privacy and security implications on Wireless- project proposal - Copy.pptx
+++ b/presentations/Privacy and security implications on Wireless- project proposal - Copy.pptx
@@ -347,7 +347,7 @@
           <a:p>
             <a:fld id="{4BDF68E2-58F2-4D09-BE8B-E3BD06533059}" type="datetimeFigureOut">
               <a:rPr lang="en-US" smtClean="0"/>
-              <a:t>5/27/2015</a:t>
+              <a:t>10/8/2015</a:t>
             </a:fld>
             <a:endParaRPr lang="en-US" dirty="0"/>
           </a:p>
@@ -555,7 +555,7 @@
           <a:p>
             <a:fld id="{2E2D6473-DF6D-4702-B328-E0DD40540A4E}" type="datetimeFigureOut">
               <a:rPr lang="en-US" smtClean="0"/>
-              <a:t>5/27/2015</a:t>
+              <a:t>10/8/2015</a:t>
             </a:fld>
             <a:endParaRPr lang="en-US" dirty="0"/>
           </a:p>
@@ -811,7 +811,7 @@
           <a:p>
             <a:fld id="{E26F7E3A-B166-407D-9866-32884E7D5B37}" type="datetimeFigureOut">
               <a:rPr lang="en-US" smtClean="0"/>
-              <a:t>5/27/2015</a:t>
+              <a:t>10/8/2015</a:t>
             </a:fld>
             <a:endParaRPr lang="en-US" dirty="0"/>
           </a:p>
@@ -981,7 +981,7 @@
           <a:p>
             <a:fld id="{528FC5F6-F338-4AE4-BB23-26385BCFC423}" type="datetimeFigureOut">
               <a:rPr lang="en-US" smtClean="0"/>
-              <a:t>5/27/2015</a:t>
+              <a:t>10/8/2015</a:t>
             </a:fld>
             <a:endParaRPr lang="en-US" dirty="0"/>
           </a:p>
@@ -1324,7 +1324,7 @@
           <a:p>
             <a:fld id="{20EBB0C4-6273-4C6E-B9BD-2EDC30F1CD52}" type="datetimeFigureOut">
               <a:rPr lang="en-US" smtClean="0"/>
-              <a:t>5/27/2015</a:t>
+              <a:t>10/8/2015</a:t>
             </a:fld>
             <a:endParaRPr lang="en-US" dirty="0"/>
           </a:p>
@@ -1599,7 +1599,7 @@
           <a:p>
             <a:fld id="{19AB4D41-86C1-4908-B66A-0B50CEB3BF29}" type="datetimeFigureOut">
               <a:rPr lang="en-US" smtClean="0"/>
-              <a:t>5/27/2015</a:t>
+              <a:t>10/8/2015</a:t>
             </a:fld>
             <a:endParaRPr lang="en-US" dirty="0"/>
           </a:p>
@@ -1978,7 +1978,7 @@
           <a:p>
             <a:fld id="{E6426E2C-56C1-4E0D-A793-0088A7FDD37E}" type="datetimeFigureOut">
               <a:rPr lang="en-US" smtClean="0"/>
-              <a:t>5/27/2015</a:t>
+              <a:t>10/8/2015</a:t>
             </a:fld>
             <a:endParaRPr lang="en-US" dirty="0"/>
           </a:p>
@@ -2096,7 +2096,7 @@
           <a:p>
             <a:fld id="{C8C39B41-D8B5-4052-B551-9B5525EAA8B6}" type="datetimeFigureOut">
               <a:rPr lang="en-US" smtClean="0"/>
-              <a:t>5/27/2015</a:t>
+              <a:t>10/8/2015</a:t>
             </a:fld>
             <a:endParaRPr lang="en-US" dirty="0"/>
           </a:p>
@@ -2267,7 +2267,7 @@
           <a:p>
             <a:fld id="{4D94136C-8742-45B2-AF27-D93DF72833A9}" type="datetimeFigureOut">
               <a:rPr lang="en-US" smtClean="0"/>
-              <a:t>5/27/2015</a:t>
+              <a:t>10/8/2015</a:t>
             </a:fld>
             <a:endParaRPr lang="en-US" dirty="0"/>
           </a:p>
@@ -2622,7 +2622,7 @@
           <a:p>
             <a:fld id="{32ABBEA6-7C60-4B02-AE87-00D78D8422AF}" type="datetimeFigureOut">
               <a:rPr lang="en-US" smtClean="0"/>
-              <a:t>5/27/2015</a:t>
+              <a:t>10/8/2015</a:t>
             </a:fld>
             <a:endParaRPr lang="en-US" dirty="0"/>
           </a:p>
@@ -3000,7 +3000,7 @@
           <a:p>
             <a:fld id="{C9CAD897-D46E-4AD2-BD9B-49DD3E640873}" type="datetimeFigureOut">
               <a:rPr lang="en-US" smtClean="0"/>
-              <a:t>5/27/2015</a:t>
+              <a:t>10/8/2015</a:t>
             </a:fld>
             <a:endParaRPr lang="en-US" dirty="0"/>
           </a:p>
@@ -3287,7 +3287,7 @@
           <a:p>
             <a:fld id="{98624D31-43A5-475A-80CF-332C9F6DCF35}" type="datetimeFigureOut">
               <a:rPr lang="en-US" smtClean="0"/>
-              <a:t>5/27/2015</a:t>
+              <a:t>10/8/2015</a:t>
             </a:fld>
             <a:endParaRPr lang="en-US" dirty="0"/>
           </a:p>
@@ -4187,11 +4187,7 @@
           <a:p>
             <a:r>
               <a:rPr lang="en-US" dirty="0" smtClean="0"/>
-              <a:t>Related </a:t>
-            </a:r>
-            <a:r>
-              <a:rPr lang="en-US" dirty="0" smtClean="0"/>
-              <a:t>Work…</a:t>
+              <a:t>Related Work…</a:t>
             </a:r>
             <a:endParaRPr lang="en-US" dirty="0"/>
           </a:p>
@@ -4218,42 +4214,16 @@
             </a:pPr>
             <a:r>
               <a:rPr lang="en-US" dirty="0"/>
-              <a:t>Radio Tomographic </a:t>
-            </a:r>
-            <a:r>
-              <a:rPr lang="en-US" dirty="0" smtClean="0"/>
-              <a:t>Imaging </a:t>
+              <a:t>J. Wilson and N. </a:t>
+            </a:r>
+            <a:r>
+              <a:rPr lang="en-US" dirty="0" err="1"/>
+              <a:t>Patwari</a:t>
             </a:r>
             <a:r>
               <a:rPr lang="en-US" dirty="0"/>
-              <a:t>with Wireless Networks by Joey </a:t>
-            </a:r>
-            <a:r>
-              <a:rPr lang="en-US" dirty="0" smtClean="0"/>
-              <a:t>Wilson, Neal </a:t>
-            </a:r>
-            <a:r>
-              <a:rPr lang="en-US" dirty="0" err="1" smtClean="0"/>
-              <a:t>Patwari</a:t>
-            </a:r>
-            <a:r>
-              <a:rPr lang="en-US" dirty="0" smtClean="0"/>
-              <a:t>: University </a:t>
-            </a:r>
-            <a:r>
-              <a:rPr lang="en-US" dirty="0"/>
-              <a:t>of </a:t>
-            </a:r>
-            <a:r>
-              <a:rPr lang="en-US" dirty="0" smtClean="0"/>
-              <a:t>Utah</a:t>
-            </a:r>
-          </a:p>
-          <a:p>
-            <a:pPr marL="288925" indent="-288925">
-              <a:buFont typeface="Arial" panose="020B0604020202020204" pitchFamily="34" charset="0"/>
-              <a:buChar char="•"/>
-            </a:pPr>
+              <a:t>, “Radio tomographic imaging with wireless networks,” IEEE Transactions on Mobile Computing, vol. 9, no. 5, pp. 621–632, May 2010. Published, 01/08/2010. </a:t>
+            </a:r>
             <a:endParaRPr lang="en-US" dirty="0"/>
           </a:p>
         </p:txBody>
@@ -4274,7 +4244,7 @@
         </p:blipFill>
         <p:spPr>
           <a:xfrm>
-            <a:off x="822959" y="2616170"/>
+            <a:off x="822959" y="2792817"/>
             <a:ext cx="3266547" cy="2482488"/>
           </a:xfrm>
           <a:prstGeom prst="rect">
@@ -4290,7 +4260,7 @@
         </p:nvSpPr>
         <p:spPr>
           <a:xfrm>
-            <a:off x="3861520" y="2763907"/>
+            <a:off x="3861520" y="2940554"/>
             <a:ext cx="4214075" cy="1754326"/>
           </a:xfrm>
           <a:prstGeom prst="rect">
@@ -4306,16 +4276,13 @@
           <a:p>
             <a:r>
               <a:rPr lang="en-US" dirty="0"/>
-              <a:t>An illustration of an Radio tomographic imaging (</a:t>
-            </a:r>
-            <a:r>
-              <a:rPr lang="en-US" dirty="0" smtClean="0"/>
-              <a:t>RTI) </a:t>
-            </a:r>
-            <a:r>
-              <a:rPr lang="en-US" dirty="0"/>
-              <a:t>network. Each node broadcasts to the others, creating many projections that can be used to reconstruct an image of objects inside the network area.</a:t>
-            </a:r>
+              <a:t>An illustration of an Radio tomographic imaging (RTI) network. </a:t>
+            </a:r>
+            <a:r>
+              <a:rPr lang="en-US"/>
+              <a:t>Each node broadcasts to the others, creating many projections that can be used to reconstruct an image of objects inside the network area.</a:t>
+            </a:r>
+            <a:endParaRPr lang="en-US" dirty="0"/>
           </a:p>
         </p:txBody>
       </p:sp>
@@ -4373,11 +4340,7 @@
           <a:p>
             <a:r>
               <a:rPr lang="en-US" dirty="0" smtClean="0"/>
-              <a:t>Related </a:t>
-            </a:r>
-            <a:r>
-              <a:rPr lang="en-US" dirty="0" smtClean="0"/>
-              <a:t>Work </a:t>
+              <a:t>Related Work </a:t>
             </a:r>
             <a:r>
               <a:rPr lang="en-US" dirty="0" err="1" smtClean="0"/>
@@ -4727,7 +4690,6 @@
               <a:rPr lang="en-US" dirty="0" smtClean="0"/>
               <a:t>objects.</a:t>
             </a:r>
-            <a:endParaRPr lang="en-US" dirty="0" smtClean="0"/>
           </a:p>
           <a:p>
             <a:pPr marL="288925" indent="-288925">

</xml_diff>